<commit_message>
Problema 'En grupo' que tuve que hacer solo listo!!
</commit_message>
<xml_diff>
--- a/Charla/Listas Enlazadas.pptx
+++ b/Charla/Listas Enlazadas.pptx
@@ -118,6 +118,11 @@
       </a:defRPr>
     </a:lvl9pPr>
   </p:defaultTextStyle>
+  <p:extLst>
+    <p:ext uri="{EFAFB233-063F-42B5-8137-9DF3F51BA10A}">
+      <p15:sldGuideLst xmlns:p15="http://schemas.microsoft.com/office/powerpoint/2012/main"/>
+    </p:ext>
+  </p:extLst>
 </p:presentation>
 </file>
 
@@ -402,13 +407,13 @@
   <p:clrMapOvr>
     <a:masterClrMapping/>
   </p:clrMapOvr>
-  <mc:AlternateContent xmlns:mc="http://schemas.openxmlformats.org/markup-compatibility/2006">
-    <mc:Choice xmlns:p14="http://schemas.microsoft.com/office/powerpoint/2010/main" Requires="p14">
+  <mc:AlternateContent xmlns:mc="http://schemas.openxmlformats.org/markup-compatibility/2006" xmlns:p14="http://schemas.microsoft.com/office/powerpoint/2010/main">
+    <mc:Choice Requires="p14">
       <p:transition spd="slow" p14:dur="1500">
         <p:random/>
       </p:transition>
     </mc:Choice>
-    <mc:Fallback>
+    <mc:Fallback xmlns="">
       <p:transition spd="slow">
         <p:random/>
       </p:transition>
@@ -581,13 +586,13 @@
   <p:clrMapOvr>
     <a:masterClrMapping/>
   </p:clrMapOvr>
-  <mc:AlternateContent xmlns:mc="http://schemas.openxmlformats.org/markup-compatibility/2006">
-    <mc:Choice xmlns:p14="http://schemas.microsoft.com/office/powerpoint/2010/main" Requires="p14">
+  <mc:AlternateContent xmlns:mc="http://schemas.openxmlformats.org/markup-compatibility/2006" xmlns:p14="http://schemas.microsoft.com/office/powerpoint/2010/main">
+    <mc:Choice Requires="p14">
       <p:transition spd="slow" p14:dur="1500">
         <p:random/>
       </p:transition>
     </mc:Choice>
-    <mc:Fallback>
+    <mc:Fallback xmlns="">
       <p:transition spd="slow">
         <p:random/>
       </p:transition>
@@ -770,13 +775,13 @@
   <p:clrMapOvr>
     <a:masterClrMapping/>
   </p:clrMapOvr>
-  <mc:AlternateContent xmlns:mc="http://schemas.openxmlformats.org/markup-compatibility/2006">
-    <mc:Choice xmlns:p14="http://schemas.microsoft.com/office/powerpoint/2010/main" Requires="p14">
+  <mc:AlternateContent xmlns:mc="http://schemas.openxmlformats.org/markup-compatibility/2006" xmlns:p14="http://schemas.microsoft.com/office/powerpoint/2010/main">
+    <mc:Choice Requires="p14">
       <p:transition spd="slow" p14:dur="1500">
         <p:random/>
       </p:transition>
     </mc:Choice>
-    <mc:Fallback>
+    <mc:Fallback xmlns="">
       <p:transition spd="slow">
         <p:random/>
       </p:transition>
@@ -949,13 +954,13 @@
   <p:clrMapOvr>
     <a:masterClrMapping/>
   </p:clrMapOvr>
-  <mc:AlternateContent xmlns:mc="http://schemas.openxmlformats.org/markup-compatibility/2006">
-    <mc:Choice xmlns:p14="http://schemas.microsoft.com/office/powerpoint/2010/main" Requires="p14">
+  <mc:AlternateContent xmlns:mc="http://schemas.openxmlformats.org/markup-compatibility/2006" xmlns:p14="http://schemas.microsoft.com/office/powerpoint/2010/main">
+    <mc:Choice Requires="p14">
       <p:transition spd="slow" p14:dur="1500">
         <p:random/>
       </p:transition>
     </mc:Choice>
-    <mc:Fallback>
+    <mc:Fallback xmlns="">
       <p:transition spd="slow">
         <p:random/>
       </p:transition>
@@ -1216,13 +1221,13 @@
   <p:clrMapOvr>
     <a:masterClrMapping/>
   </p:clrMapOvr>
-  <mc:AlternateContent xmlns:mc="http://schemas.openxmlformats.org/markup-compatibility/2006">
-    <mc:Choice xmlns:p14="http://schemas.microsoft.com/office/powerpoint/2010/main" Requires="p14">
+  <mc:AlternateContent xmlns:mc="http://schemas.openxmlformats.org/markup-compatibility/2006" xmlns:p14="http://schemas.microsoft.com/office/powerpoint/2010/main">
+    <mc:Choice Requires="p14">
       <p:transition spd="slow" p14:dur="1500">
         <p:random/>
       </p:transition>
     </mc:Choice>
-    <mc:Fallback>
+    <mc:Fallback xmlns="">
       <p:transition spd="slow">
         <p:random/>
       </p:transition>
@@ -1513,13 +1518,13 @@
   <p:clrMapOvr>
     <a:masterClrMapping/>
   </p:clrMapOvr>
-  <mc:AlternateContent xmlns:mc="http://schemas.openxmlformats.org/markup-compatibility/2006">
-    <mc:Choice xmlns:p14="http://schemas.microsoft.com/office/powerpoint/2010/main" Requires="p14">
+  <mc:AlternateContent xmlns:mc="http://schemas.openxmlformats.org/markup-compatibility/2006" xmlns:p14="http://schemas.microsoft.com/office/powerpoint/2010/main">
+    <mc:Choice Requires="p14">
       <p:transition spd="slow" p14:dur="1500">
         <p:random/>
       </p:transition>
     </mc:Choice>
-    <mc:Fallback>
+    <mc:Fallback xmlns="">
       <p:transition spd="slow">
         <p:random/>
       </p:transition>
@@ -1964,13 +1969,13 @@
   <p:clrMapOvr>
     <a:masterClrMapping/>
   </p:clrMapOvr>
-  <mc:AlternateContent xmlns:mc="http://schemas.openxmlformats.org/markup-compatibility/2006">
-    <mc:Choice xmlns:p14="http://schemas.microsoft.com/office/powerpoint/2010/main" Requires="p14">
+  <mc:AlternateContent xmlns:mc="http://schemas.openxmlformats.org/markup-compatibility/2006" xmlns:p14="http://schemas.microsoft.com/office/powerpoint/2010/main">
+    <mc:Choice Requires="p14">
       <p:transition spd="slow" p14:dur="1500">
         <p:random/>
       </p:transition>
     </mc:Choice>
-    <mc:Fallback>
+    <mc:Fallback xmlns="">
       <p:transition spd="slow">
         <p:random/>
       </p:transition>
@@ -2091,13 +2096,13 @@
   <p:clrMapOvr>
     <a:masterClrMapping/>
   </p:clrMapOvr>
-  <mc:AlternateContent xmlns:mc="http://schemas.openxmlformats.org/markup-compatibility/2006">
-    <mc:Choice xmlns:p14="http://schemas.microsoft.com/office/powerpoint/2010/main" Requires="p14">
+  <mc:AlternateContent xmlns:mc="http://schemas.openxmlformats.org/markup-compatibility/2006" xmlns:p14="http://schemas.microsoft.com/office/powerpoint/2010/main">
+    <mc:Choice Requires="p14">
       <p:transition spd="slow" p14:dur="1500">
         <p:random/>
       </p:transition>
     </mc:Choice>
-    <mc:Fallback>
+    <mc:Fallback xmlns="">
       <p:transition spd="slow">
         <p:random/>
       </p:transition>
@@ -2195,13 +2200,13 @@
   <p:clrMapOvr>
     <a:masterClrMapping/>
   </p:clrMapOvr>
-  <mc:AlternateContent xmlns:mc="http://schemas.openxmlformats.org/markup-compatibility/2006">
-    <mc:Choice xmlns:p14="http://schemas.microsoft.com/office/powerpoint/2010/main" Requires="p14">
+  <mc:AlternateContent xmlns:mc="http://schemas.openxmlformats.org/markup-compatibility/2006" xmlns:p14="http://schemas.microsoft.com/office/powerpoint/2010/main">
+    <mc:Choice Requires="p14">
       <p:transition spd="slow" p14:dur="1500">
         <p:random/>
       </p:transition>
     </mc:Choice>
-    <mc:Fallback>
+    <mc:Fallback xmlns="">
       <p:transition spd="slow">
         <p:random/>
       </p:transition>
@@ -2492,13 +2497,13 @@
   <p:clrMapOvr>
     <a:masterClrMapping/>
   </p:clrMapOvr>
-  <mc:AlternateContent xmlns:mc="http://schemas.openxmlformats.org/markup-compatibility/2006">
-    <mc:Choice xmlns:p14="http://schemas.microsoft.com/office/powerpoint/2010/main" Requires="p14">
+  <mc:AlternateContent xmlns:mc="http://schemas.openxmlformats.org/markup-compatibility/2006" xmlns:p14="http://schemas.microsoft.com/office/powerpoint/2010/main">
+    <mc:Choice Requires="p14">
       <p:transition spd="slow" p14:dur="1500">
         <p:random/>
       </p:transition>
     </mc:Choice>
-    <mc:Fallback>
+    <mc:Fallback xmlns="">
       <p:transition spd="slow">
         <p:random/>
       </p:transition>
@@ -2780,13 +2785,13 @@
   <p:clrMapOvr>
     <a:masterClrMapping/>
   </p:clrMapOvr>
-  <mc:AlternateContent xmlns:mc="http://schemas.openxmlformats.org/markup-compatibility/2006">
-    <mc:Choice xmlns:p14="http://schemas.microsoft.com/office/powerpoint/2010/main" Requires="p14">
+  <mc:AlternateContent xmlns:mc="http://schemas.openxmlformats.org/markup-compatibility/2006" xmlns:p14="http://schemas.microsoft.com/office/powerpoint/2010/main">
+    <mc:Choice Requires="p14">
       <p:transition spd="slow" p14:dur="1500">
         <p:random/>
       </p:transition>
     </mc:Choice>
-    <mc:Fallback>
+    <mc:Fallback xmlns="">
       <p:transition spd="slow">
         <p:random/>
       </p:transition>
@@ -3129,13 +3134,13 @@
     <p:sldLayoutId id="2147483850" r:id="rId10"/>
     <p:sldLayoutId id="2147483851" r:id="rId11"/>
   </p:sldLayoutIdLst>
-  <mc:AlternateContent xmlns:mc="http://schemas.openxmlformats.org/markup-compatibility/2006">
-    <mc:Choice xmlns:p14="http://schemas.microsoft.com/office/powerpoint/2010/main" Requires="p14">
+  <mc:AlternateContent xmlns:mc="http://schemas.openxmlformats.org/markup-compatibility/2006" xmlns:p14="http://schemas.microsoft.com/office/powerpoint/2010/main">
+    <mc:Choice Requires="p14">
       <p:transition spd="slow" p14:dur="1500">
         <p:random/>
       </p:transition>
     </mc:Choice>
-    <mc:Fallback>
+    <mc:Fallback xmlns="">
       <p:transition spd="slow">
         <p:random/>
       </p:transition>
@@ -3636,13 +3641,13 @@
   <p:clrMapOvr>
     <a:masterClrMapping/>
   </p:clrMapOvr>
-  <mc:AlternateContent xmlns:mc="http://schemas.openxmlformats.org/markup-compatibility/2006">
-    <mc:Choice xmlns:p14="http://schemas.microsoft.com/office/powerpoint/2010/main" Requires="p14">
+  <mc:AlternateContent xmlns:mc="http://schemas.openxmlformats.org/markup-compatibility/2006" xmlns:p14="http://schemas.microsoft.com/office/powerpoint/2010/main">
+    <mc:Choice Requires="p14">
       <p:transition spd="slow" p14:dur="1500">
         <p:random/>
       </p:transition>
     </mc:Choice>
-    <mc:Fallback>
+    <mc:Fallback xmlns="">
       <p:transition spd="slow">
         <p:random/>
       </p:transition>
@@ -3660,6 +3665,9 @@
                     <p:cTn id="3" fill="hold">
                       <p:stCondLst>
                         <p:cond delay="indefinite"/>
+                        <p:cond evt="onBegin" delay="0">
+                          <p:tn val="2"/>
+                        </p:cond>
                       </p:stCondLst>
                       <p:childTnLst>
                         <p:par>
@@ -3669,7 +3677,7 @@
                             </p:stCondLst>
                             <p:childTnLst>
                               <p:par>
-                                <p:cTn id="5" presetID="10" presetClass="entr" presetSubtype="0" fill="hold" grpId="0" nodeType="clickEffect">
+                                <p:cTn id="5" presetID="10" presetClass="entr" presetSubtype="0" fill="hold" grpId="0" nodeType="withEffect">
                                   <p:stCondLst>
                                     <p:cond delay="0"/>
                                   </p:stCondLst>
@@ -3682,11 +3690,7 @@
                                           </p:stCondLst>
                                         </p:cTn>
                                         <p:tgtEl>
-                                          <p:spTgt spid="3">
-                                            <p:txEl>
-                                              <p:pRg st="0" end="0"/>
-                                            </p:txEl>
-                                          </p:spTgt>
+                                          <p:spTgt spid="2"/>
                                         </p:tgtEl>
                                         <p:attrNameLst>
                                           <p:attrName>style.visibility</p:attrName>
@@ -3700,11 +3704,7 @@
                                       <p:cBhvr>
                                         <p:cTn id="7" dur="500"/>
                                         <p:tgtEl>
-                                          <p:spTgt spid="3">
-                                            <p:txEl>
-                                              <p:pRg st="0" end="0"/>
-                                            </p:txEl>
-                                          </p:spTgt>
+                                          <p:spTgt spid="2"/>
                                         </p:tgtEl>
                                       </p:cBhvr>
                                     </p:animEffect>
@@ -3745,7 +3745,7 @@
                                         <p:tgtEl>
                                           <p:spTgt spid="3">
                                             <p:txEl>
-                                              <p:pRg st="1" end="1"/>
+                                              <p:pRg st="0" end="0"/>
                                             </p:txEl>
                                           </p:spTgt>
                                         </p:tgtEl>
@@ -3763,7 +3763,7 @@
                                         <p:tgtEl>
                                           <p:spTgt spid="3">
                                             <p:txEl>
-                                              <p:pRg st="1" end="1"/>
+                                              <p:pRg st="0" end="0"/>
                                             </p:txEl>
                                           </p:spTgt>
                                         </p:tgtEl>
@@ -3772,21 +3772,43 @@
                                   </p:childTnLst>
                                 </p:cTn>
                               </p:par>
+                            </p:childTnLst>
+                          </p:cTn>
+                        </p:par>
+                      </p:childTnLst>
+                    </p:cTn>
+                  </p:par>
+                  <p:par>
+                    <p:cTn id="13" fill="hold">
+                      <p:stCondLst>
+                        <p:cond delay="indefinite"/>
+                      </p:stCondLst>
+                      <p:childTnLst>
+                        <p:par>
+                          <p:cTn id="14" fill="hold">
+                            <p:stCondLst>
+                              <p:cond delay="0"/>
+                            </p:stCondLst>
+                            <p:childTnLst>
                               <p:par>
-                                <p:cTn id="13" presetID="10" presetClass="entr" presetSubtype="0" fill="hold" grpId="0" nodeType="withEffect">
+                                <p:cTn id="15" presetID="10" presetClass="entr" presetSubtype="0" fill="hold" grpId="0" nodeType="clickEffect">
                                   <p:stCondLst>
                                     <p:cond delay="0"/>
                                   </p:stCondLst>
                                   <p:childTnLst>
                                     <p:set>
                                       <p:cBhvr>
-                                        <p:cTn id="14" dur="1" fill="hold">
+                                        <p:cTn id="16" dur="1" fill="hold">
                                           <p:stCondLst>
                                             <p:cond delay="0"/>
                                           </p:stCondLst>
                                         </p:cTn>
                                         <p:tgtEl>
-                                          <p:spTgt spid="2"/>
+                                          <p:spTgt spid="3">
+                                            <p:txEl>
+                                              <p:pRg st="1" end="1"/>
+                                            </p:txEl>
+                                          </p:spTgt>
                                         </p:tgtEl>
                                         <p:attrNameLst>
                                           <p:attrName>style.visibility</p:attrName>
@@ -3798,9 +3820,13 @@
                                     </p:set>
                                     <p:animEffect transition="in" filter="fade">
                                       <p:cBhvr>
-                                        <p:cTn id="15" dur="500"/>
-                                        <p:tgtEl>
-                                          <p:spTgt spid="2"/>
+                                        <p:cTn id="17" dur="500"/>
+                                        <p:tgtEl>
+                                          <p:spTgt spid="3">
+                                            <p:txEl>
+                                              <p:pRg st="1" end="1"/>
+                                            </p:txEl>
+                                          </p:spTgt>
                                         </p:tgtEl>
                                       </p:cBhvr>
                                     </p:animEffect>
@@ -4273,13 +4299,13 @@
   <p:clrMapOvr>
     <a:masterClrMapping/>
   </p:clrMapOvr>
-  <mc:AlternateContent xmlns:mc="http://schemas.openxmlformats.org/markup-compatibility/2006">
-    <mc:Choice xmlns:p14="http://schemas.microsoft.com/office/powerpoint/2010/main" Requires="p14">
+  <mc:AlternateContent xmlns:mc="http://schemas.openxmlformats.org/markup-compatibility/2006" xmlns:p14="http://schemas.microsoft.com/office/powerpoint/2010/main">
+    <mc:Choice Requires="p14">
       <p:transition spd="slow" p14:dur="1500">
         <p:random/>
       </p:transition>
     </mc:Choice>
-    <mc:Fallback>
+    <mc:Fallback xmlns="">
       <p:transition spd="slow">
         <p:random/>
       </p:transition>
@@ -4835,13 +4861,13 @@
   <p:clrMapOvr>
     <a:masterClrMapping/>
   </p:clrMapOvr>
-  <mc:AlternateContent xmlns:mc="http://schemas.openxmlformats.org/markup-compatibility/2006">
-    <mc:Choice xmlns:p14="http://schemas.microsoft.com/office/powerpoint/2010/main" Requires="p14">
+  <mc:AlternateContent xmlns:mc="http://schemas.openxmlformats.org/markup-compatibility/2006" xmlns:p14="http://schemas.microsoft.com/office/powerpoint/2010/main">
+    <mc:Choice Requires="p14">
       <p:transition spd="slow" p14:dur="1500">
         <p:random/>
       </p:transition>
     </mc:Choice>
-    <mc:Fallback>
+    <mc:Fallback xmlns="">
       <p:transition spd="slow">
         <p:random/>
       </p:transition>
@@ -5245,14 +5271,11 @@
               <a:rPr lang="en-US" dirty="0" err="1">
                 <a:latin typeface="AvenirNext LT Pro Bold" panose="020B0804020202020204" pitchFamily="34" charset="0"/>
               </a:rPr>
-              <a:t>eliminación</a:t>
-            </a:r>
-            <a:r>
-              <a:rPr lang="en-US" dirty="0">
-                <a:latin typeface="AvenirNext LT Pro Bold" panose="020B0804020202020204" pitchFamily="34" charset="0"/>
-              </a:rPr>
-              <a:t> </a:t>
-            </a:r>
+              <a:t>localización</a:t>
+            </a:r>
+            <a:endParaRPr lang="en-US" dirty="0">
+              <a:latin typeface="AvenirNext LT Pro Bold" panose="020B0804020202020204" pitchFamily="34" charset="0"/>
+            </a:endParaRPr>
           </a:p>
         </p:txBody>
       </p:sp>
@@ -5294,7 +5317,7 @@
             </a:r>
             <a:r>
               <a:rPr lang="en-US" sz="2400" dirty="0" err="1"/>
-              <a:t>eliminar</a:t>
+              <a:t>localizar</a:t>
             </a:r>
             <a:r>
               <a:rPr lang="en-US" sz="2400" dirty="0"/>
@@ -6012,13 +6035,13 @@
   <p:clrMapOvr>
     <a:masterClrMapping/>
   </p:clrMapOvr>
-  <mc:AlternateContent xmlns:mc="http://schemas.openxmlformats.org/markup-compatibility/2006">
-    <mc:Choice xmlns:p14="http://schemas.microsoft.com/office/powerpoint/2010/main" Requires="p14">
+  <mc:AlternateContent xmlns:mc="http://schemas.openxmlformats.org/markup-compatibility/2006" xmlns:p14="http://schemas.microsoft.com/office/powerpoint/2010/main">
+    <mc:Choice Requires="p14">
       <p:transition spd="slow" p14:dur="1500">
         <p:random/>
       </p:transition>
     </mc:Choice>
-    <mc:Fallback>
+    <mc:Fallback xmlns="">
       <p:transition spd="slow">
         <p:random/>
       </p:transition>
@@ -6805,13 +6828,13 @@
   <p:clrMapOvr>
     <a:masterClrMapping/>
   </p:clrMapOvr>
-  <mc:AlternateContent xmlns:mc="http://schemas.openxmlformats.org/markup-compatibility/2006">
-    <mc:Choice xmlns:p14="http://schemas.microsoft.com/office/powerpoint/2010/main" Requires="p14">
+  <mc:AlternateContent xmlns:mc="http://schemas.openxmlformats.org/markup-compatibility/2006" xmlns:p14="http://schemas.microsoft.com/office/powerpoint/2010/main">
+    <mc:Choice Requires="p14">
       <p:transition spd="slow" p14:dur="1500">
         <p:random/>
       </p:transition>
     </mc:Choice>
-    <mc:Fallback>
+    <mc:Fallback xmlns="">
       <p:transition spd="slow">
         <p:random/>
       </p:transition>
@@ -7677,13 +7700,13 @@
   <p:clrMapOvr>
     <a:masterClrMapping/>
   </p:clrMapOvr>
-  <mc:AlternateContent xmlns:mc="http://schemas.openxmlformats.org/markup-compatibility/2006">
-    <mc:Choice xmlns:p14="http://schemas.microsoft.com/office/powerpoint/2010/main" Requires="p14">
+  <mc:AlternateContent xmlns:mc="http://schemas.openxmlformats.org/markup-compatibility/2006" xmlns:p14="http://schemas.microsoft.com/office/powerpoint/2010/main">
+    <mc:Choice Requires="p14">
       <p:transition spd="slow" p14:dur="1500">
         <p:random/>
       </p:transition>
     </mc:Choice>
-    <mc:Fallback>
+    <mc:Fallback xmlns="">
       <p:transition spd="slow">
         <p:random/>
       </p:transition>
@@ -7944,13 +7967,13 @@
   <p:clrMapOvr>
     <a:masterClrMapping/>
   </p:clrMapOvr>
-  <mc:AlternateContent xmlns:mc="http://schemas.openxmlformats.org/markup-compatibility/2006">
-    <mc:Choice xmlns:p14="http://schemas.microsoft.com/office/powerpoint/2010/main" Requires="p14">
+  <mc:AlternateContent xmlns:mc="http://schemas.openxmlformats.org/markup-compatibility/2006" xmlns:p14="http://schemas.microsoft.com/office/powerpoint/2010/main">
+    <mc:Choice Requires="p14">
       <p:transition spd="slow" p14:dur="1500">
         <p:random/>
       </p:transition>
     </mc:Choice>
-    <mc:Fallback>
+    <mc:Fallback xmlns="">
       <p:transition spd="slow">
         <p:random/>
       </p:transition>
@@ -8265,12 +8288,20 @@
             </a:r>
             <a:r>
               <a:rPr lang="es-ES" sz="3600" dirty="0" err="1">
+                <a:latin typeface="Courier New" panose="02070309020205020404" pitchFamily="49" charset="0"/>
+                <a:ea typeface="Times New Roman" panose="02020603050405020304" pitchFamily="18" charset="0"/>
+                <a:cs typeface="Times New Roman" panose="02020603050405020304" pitchFamily="18" charset="0"/>
+              </a:rPr>
+              <a:t>g</a:t>
+            </a:r>
+            <a:r>
+              <a:rPr lang="es-ES" sz="3600" dirty="0" err="1">
                 <a:effectLst/>
                 <a:latin typeface="Courier New" panose="02070309020205020404" pitchFamily="49" charset="0"/>
                 <a:ea typeface="Times New Roman" panose="02020603050405020304" pitchFamily="18" charset="0"/>
                 <a:cs typeface="Times New Roman" panose="02020603050405020304" pitchFamily="18" charset="0"/>
               </a:rPr>
-              <a:t>gint</a:t>
+              <a:t>int</a:t>
             </a:r>
             <a:r>
               <a:rPr lang="es-ES" sz="3600" dirty="0">
@@ -8381,13 +8412,13 @@
   <p:clrMapOvr>
     <a:masterClrMapping/>
   </p:clrMapOvr>
-  <mc:AlternateContent xmlns:mc="http://schemas.openxmlformats.org/markup-compatibility/2006">
-    <mc:Choice xmlns:p14="http://schemas.microsoft.com/office/powerpoint/2010/main" Requires="p14">
+  <mc:AlternateContent xmlns:mc="http://schemas.openxmlformats.org/markup-compatibility/2006" xmlns:p14="http://schemas.microsoft.com/office/powerpoint/2010/main">
+    <mc:Choice Requires="p14">
       <p:transition spd="slow" p14:dur="1500">
         <p:random/>
       </p:transition>
     </mc:Choice>
-    <mc:Fallback>
+    <mc:Fallback xmlns="">
       <p:transition spd="slow">
         <p:random/>
       </p:transition>
@@ -8722,13 +8753,13 @@
   <p:clrMapOvr>
     <a:masterClrMapping/>
   </p:clrMapOvr>
-  <mc:AlternateContent xmlns:mc="http://schemas.openxmlformats.org/markup-compatibility/2006">
-    <mc:Choice xmlns:p14="http://schemas.microsoft.com/office/powerpoint/2010/main" Requires="p14">
+  <mc:AlternateContent xmlns:mc="http://schemas.openxmlformats.org/markup-compatibility/2006" xmlns:p14="http://schemas.microsoft.com/office/powerpoint/2010/main">
+    <mc:Choice Requires="p14">
       <p:transition spd="slow" p14:dur="1500">
         <p:random/>
       </p:transition>
     </mc:Choice>
-    <mc:Fallback>
+    <mc:Fallback xmlns="">
       <p:transition spd="slow">
         <p:random/>
       </p:transition>
@@ -8946,7 +8977,19 @@
               <a:rPr lang="en-US" dirty="0" err="1">
                 <a:latin typeface="AvenirNext LT Pro Bold" panose="020B0804020202020204" pitchFamily="34" charset="0"/>
               </a:rPr>
-              <a:t>Requisitos</a:t>
+              <a:t>Operadores</a:t>
+            </a:r>
+            <a:r>
+              <a:rPr lang="en-US" dirty="0">
+                <a:latin typeface="AvenirNext LT Pro Bold" panose="020B0804020202020204" pitchFamily="34" charset="0"/>
+              </a:rPr>
+              <a:t> </a:t>
+            </a:r>
+            <a:r>
+              <a:rPr lang="en-US" dirty="0" err="1">
+                <a:latin typeface="AvenirNext LT Pro Bold" panose="020B0804020202020204" pitchFamily="34" charset="0"/>
+              </a:rPr>
+              <a:t>Básicos</a:t>
             </a:r>
             <a:endParaRPr lang="en-US" dirty="0">
               <a:latin typeface="AvenirNext LT Pro Bold" panose="020B0804020202020204" pitchFamily="34" charset="0"/>
@@ -9023,13 +9066,13 @@
   <p:clrMapOvr>
     <a:masterClrMapping/>
   </p:clrMapOvr>
-  <mc:AlternateContent xmlns:mc="http://schemas.openxmlformats.org/markup-compatibility/2006">
-    <mc:Choice xmlns:p14="http://schemas.microsoft.com/office/powerpoint/2010/main" Requires="p14">
+  <mc:AlternateContent xmlns:mc="http://schemas.openxmlformats.org/markup-compatibility/2006" xmlns:p14="http://schemas.microsoft.com/office/powerpoint/2010/main">
+    <mc:Choice Requires="p14">
       <p:transition spd="slow" p14:dur="1500">
         <p:random/>
       </p:transition>
     </mc:Choice>
-    <mc:Fallback>
+    <mc:Fallback xmlns="">
       <p:transition spd="slow">
         <p:random/>
       </p:transition>
@@ -9745,13 +9788,13 @@
   <p:clrMapOvr>
     <a:masterClrMapping/>
   </p:clrMapOvr>
-  <mc:AlternateContent xmlns:mc="http://schemas.openxmlformats.org/markup-compatibility/2006">
-    <mc:Choice xmlns:p14="http://schemas.microsoft.com/office/powerpoint/2010/main" Requires="p14">
+  <mc:AlternateContent xmlns:mc="http://schemas.openxmlformats.org/markup-compatibility/2006" xmlns:p14="http://schemas.microsoft.com/office/powerpoint/2010/main">
+    <mc:Choice Requires="p14">
       <p:transition spd="slow" p14:dur="1500">
         <p:random/>
       </p:transition>
     </mc:Choice>
-    <mc:Fallback>
+    <mc:Fallback xmlns="">
       <p:transition spd="slow">
         <p:random/>
       </p:transition>
@@ -10521,13 +10564,13 @@
   <p:clrMapOvr>
     <a:masterClrMapping/>
   </p:clrMapOvr>
-  <mc:AlternateContent xmlns:mc="http://schemas.openxmlformats.org/markup-compatibility/2006">
-    <mc:Choice xmlns:p14="http://schemas.microsoft.com/office/powerpoint/2010/main" Requires="p14">
+  <mc:AlternateContent xmlns:mc="http://schemas.openxmlformats.org/markup-compatibility/2006" xmlns:p14="http://schemas.microsoft.com/office/powerpoint/2010/main">
+    <mc:Choice Requires="p14">
       <p:transition spd="slow" p14:dur="1500">
         <p:random/>
       </p:transition>
     </mc:Choice>
-    <mc:Fallback>
+    <mc:Fallback xmlns="">
       <p:transition spd="slow">
         <p:random/>
       </p:transition>
@@ -11798,13 +11841,13 @@
   <p:clrMapOvr>
     <a:masterClrMapping/>
   </p:clrMapOvr>
-  <mc:AlternateContent xmlns:mc="http://schemas.openxmlformats.org/markup-compatibility/2006">
-    <mc:Choice xmlns:p14="http://schemas.microsoft.com/office/powerpoint/2010/main" Requires="p14">
+  <mc:AlternateContent xmlns:mc="http://schemas.openxmlformats.org/markup-compatibility/2006" xmlns:p14="http://schemas.microsoft.com/office/powerpoint/2010/main">
+    <mc:Choice Requires="p14">
       <p:transition spd="slow" p14:dur="1500">
         <p:random/>
       </p:transition>
     </mc:Choice>
-    <mc:Fallback>
+    <mc:Fallback xmlns="">
       <p:transition spd="slow">
         <p:random/>
       </p:transition>
@@ -13074,13 +13117,13 @@
   <p:clrMapOvr>
     <a:masterClrMapping/>
   </p:clrMapOvr>
-  <mc:AlternateContent xmlns:mc="http://schemas.openxmlformats.org/markup-compatibility/2006">
-    <mc:Choice xmlns:p14="http://schemas.microsoft.com/office/powerpoint/2010/main" Requires="p14">
+  <mc:AlternateContent xmlns:mc="http://schemas.openxmlformats.org/markup-compatibility/2006" xmlns:p14="http://schemas.microsoft.com/office/powerpoint/2010/main">
+    <mc:Choice Requires="p14">
       <p:transition spd="slow" p14:dur="1500">
         <p:random/>
       </p:transition>
     </mc:Choice>
-    <mc:Fallback>
+    <mc:Fallback xmlns="">
       <p:transition spd="slow">
         <p:random/>
       </p:transition>
@@ -14003,13 +14046,13 @@
   <p:clrMapOvr>
     <a:masterClrMapping/>
   </p:clrMapOvr>
-  <mc:AlternateContent xmlns:mc="http://schemas.openxmlformats.org/markup-compatibility/2006">
-    <mc:Choice xmlns:p14="http://schemas.microsoft.com/office/powerpoint/2010/main" Requires="p14">
+  <mc:AlternateContent xmlns:mc="http://schemas.openxmlformats.org/markup-compatibility/2006" xmlns:p14="http://schemas.microsoft.com/office/powerpoint/2010/main">
+    <mc:Choice Requires="p14">
       <p:transition spd="slow" p14:dur="1500">
         <p:random/>
       </p:transition>
     </mc:Choice>
-    <mc:Fallback>
+    <mc:Fallback xmlns="">
       <p:transition spd="slow">
         <p:random/>
       </p:transition>

</xml_diff>